<commit_message>
Added all the blank PPTX
</commit_message>
<xml_diff>
--- a/Trunk/Getting Started Material/DCAF Training/DCAF Training [Autosaved].pptx
+++ b/Trunk/Getting Started Material/DCAF Training/DCAF Training [Autosaved].pptx
@@ -7792,7 +7792,7 @@
           <a:p>
             <a:fld id="{87ABAC35-A17E-4D37-B645-46DE044173A6}" type="datetimeFigureOut">
               <a:rPr lang="en-US" smtClean="0"/>
-              <a:t>3/23/2018</a:t>
+              <a:t>5/8/2018</a:t>
             </a:fld>
             <a:endParaRPr lang="en-US"/>
           </a:p>
@@ -17413,7 +17413,7 @@
           <a:p>
             <a:fld id="{2A7AC447-E7E2-4CB8-9708-AD60A67D99F6}" type="datetimeFigureOut">
               <a:rPr lang="en-US" smtClean="0"/>
-              <a:t>3/23/2018</a:t>
+              <a:t>5/8/2018</a:t>
             </a:fld>
             <a:endParaRPr lang="en-US"/>
           </a:p>
@@ -17602,7 +17602,7 @@
           <a:p>
             <a:fld id="{6E45710A-4519-41B6-B07B-35488FDACA05}" type="datetimeFigureOut">
               <a:rPr lang="en-US" smtClean="0"/>
-              <a:t>3/23/2018</a:t>
+              <a:t>5/8/2018</a:t>
             </a:fld>
             <a:endParaRPr lang="en-US" dirty="0"/>
           </a:p>

</xml_diff>